<commit_message>
fixed type and added TA pictures
</commit_message>
<xml_diff>
--- a/Slides/Module 01.2 Requirements Gathering.pptx
+++ b/Slides/Module 01.2 Requirements Gathering.pptx
@@ -3669,7 +3669,7 @@
           <a:p>
             <a:fld id="{7C7E5181-6CF5-45F7-A87A-E0E0B1FD7549}" type="datetimeFigureOut">
               <a:rPr lang="en-US" smtClean="0"/>
-              <a:t>8/30/2023</a:t>
+              <a:t>9/6/2023</a:t>
             </a:fld>
             <a:endParaRPr lang="en-US"/>
           </a:p>
@@ -6770,7 +6770,7 @@
           <a:p>
             <a:fld id="{5D2A64DE-480B-420F-9649-4F8E696E08E0}" type="datetime1">
               <a:rPr lang="en-US" smtClean="0"/>
-              <a:t>8/30/2023</a:t>
+              <a:t>9/6/2023</a:t>
             </a:fld>
             <a:endParaRPr lang="en-US"/>
           </a:p>
@@ -7094,7 +7094,7 @@
           <a:p>
             <a:fld id="{EA476A42-A091-4468-A075-64A31BE59948}" type="datetime1">
               <a:rPr lang="en-US" smtClean="0"/>
-              <a:t>8/30/2023</a:t>
+              <a:t>9/6/2023</a:t>
             </a:fld>
             <a:endParaRPr lang="en-US"/>
           </a:p>
@@ -7292,7 +7292,7 @@
           <a:p>
             <a:fld id="{0D3616D0-8311-4107-9726-6B805E7D05BA}" type="datetime1">
               <a:rPr lang="en-US" smtClean="0"/>
-              <a:t>8/30/2023</a:t>
+              <a:t>9/6/2023</a:t>
             </a:fld>
             <a:endParaRPr lang="en-US"/>
           </a:p>
@@ -7500,7 +7500,7 @@
           <a:p>
             <a:fld id="{3BC2557A-5C88-417A-A763-5AC779462A5F}" type="datetime1">
               <a:rPr lang="en-US" smtClean="0"/>
-              <a:t>8/30/2023</a:t>
+              <a:t>9/6/2023</a:t>
             </a:fld>
             <a:endParaRPr lang="en-US"/>
           </a:p>
@@ -8024,7 +8024,7 @@
           <a:p>
             <a:fld id="{07C7BFD4-467E-4EDE-93EA-052F5B39A4E5}" type="datetime1">
               <a:rPr lang="en-US" smtClean="0"/>
-              <a:t>8/30/2023</a:t>
+              <a:t>9/6/2023</a:t>
             </a:fld>
             <a:endParaRPr lang="en-US"/>
           </a:p>
@@ -8274,7 +8274,7 @@
           <a:p>
             <a:fld id="{07C7BFD4-467E-4EDE-93EA-052F5B39A4E5}" type="datetime1">
               <a:rPr lang="en-US" smtClean="0"/>
-              <a:t>8/30/2023</a:t>
+              <a:t>9/6/2023</a:t>
             </a:fld>
             <a:endParaRPr lang="en-US"/>
           </a:p>
@@ -8456,7 +8456,7 @@
           <a:p>
             <a:fld id="{109E55A0-C911-4F03-82FC-7E5926047D46}" type="datetime1">
               <a:rPr lang="en-US" smtClean="0"/>
-              <a:t>8/30/2023</a:t>
+              <a:t>9/6/2023</a:t>
             </a:fld>
             <a:endParaRPr lang="en-US"/>
           </a:p>
@@ -8769,7 +8769,7 @@
           <a:p>
             <a:fld id="{A533CBE2-D5BE-47AC-ADC2-9CDFC1D0CF90}" type="datetime1">
               <a:rPr lang="en-US" smtClean="0"/>
-              <a:t>8/30/2023</a:t>
+              <a:t>9/6/2023</a:t>
             </a:fld>
             <a:endParaRPr lang="en-US"/>
           </a:p>
@@ -9070,7 +9070,7 @@
           <a:p>
             <a:fld id="{39B7EDB1-CE74-4951-85A2-0B01C2128E28}" type="datetime1">
               <a:rPr lang="en-US" smtClean="0"/>
-              <a:t>8/30/2023</a:t>
+              <a:t>9/6/2023</a:t>
             </a:fld>
             <a:endParaRPr lang="en-US"/>
           </a:p>
@@ -9518,7 +9518,7 @@
           <a:p>
             <a:fld id="{2BC7EB92-A5C2-4807-A9DC-9EDE6CBFB241}" type="datetime1">
               <a:rPr lang="en-US" smtClean="0"/>
-              <a:t>8/30/2023</a:t>
+              <a:t>9/6/2023</a:t>
             </a:fld>
             <a:endParaRPr lang="en-US"/>
           </a:p>
@@ -9631,7 +9631,7 @@
           <a:p>
             <a:fld id="{2B7B7EE0-7771-4CD5-9B2B-3550753A54A1}" type="datetime1">
               <a:rPr lang="en-US" smtClean="0"/>
-              <a:t>8/30/2023</a:t>
+              <a:t>9/6/2023</a:t>
             </a:fld>
             <a:endParaRPr lang="en-US"/>
           </a:p>
@@ -9942,7 +9942,7 @@
           <a:p>
             <a:fld id="{F8B318B3-0E87-4416-A9B8-D891968C2727}" type="datetime1">
               <a:rPr lang="en-US" smtClean="0"/>
-              <a:t>8/30/2023</a:t>
+              <a:t>9/6/2023</a:t>
             </a:fld>
             <a:endParaRPr lang="en-US"/>
           </a:p>
@@ -10183,7 +10183,7 @@
           <a:p>
             <a:fld id="{54D997E8-DDEE-43F1-8D9B-F8A1E11DE488}" type="datetime1">
               <a:rPr lang="en-US" smtClean="0"/>
-              <a:t>8/30/2023</a:t>
+              <a:t>9/6/2023</a:t>
             </a:fld>
             <a:endParaRPr lang="en-US"/>
           </a:p>
@@ -14633,7 +14633,15 @@
           <a:p>
             <a:r>
               <a:rPr lang="en-US" sz="2400" dirty="0"/>
-              <a:t>Client might provide all requirements, or just some subset (e.g. “must be HIPPA compliant”)</a:t>
+              <a:t>Client might provide all requirements, or just some subset (e.g. “must </a:t>
+            </a:r>
+            <a:r>
+              <a:rPr lang="en-US" sz="2400"/>
+              <a:t>be HIPAA </a:t>
+            </a:r>
+            <a:r>
+              <a:rPr lang="en-US" sz="2400" dirty="0"/>
+              <a:t>compliant”)</a:t>
             </a:r>
           </a:p>
         </p:txBody>

</xml_diff>